<commit_message>
Day 12 work notes updated
</commit_message>
<xml_diff>
--- a/Day12/DockerAndKubernetes_Training-Day12.pptx
+++ b/Day12/DockerAndKubernetes_Training-Day12.pptx
@@ -14187,6 +14187,13 @@
             </a:r>
           </a:p>
           <a:p>
+            <a:pPr lvl="1"/>
+            <a:r>
+              <a:rPr lang="en-IN" dirty="0"/>
+              <a:t>Official Docker</a:t>
+            </a:r>
+          </a:p>
+          <a:p>
             <a:r>
               <a:rPr lang="en-IN" dirty="0"/>
               <a:t>Docker Compose Awesome Examples – </a:t>
@@ -14195,7 +14202,7 @@
           <a:p>
             <a:pPr lvl="1"/>
             <a:r>
-              <a:rPr lang="en-IN">
+              <a:rPr lang="en-IN" dirty="0">
                 <a:hlinkClick r:id="rId2"/>
               </a:rPr>
               <a:t>https://github.com/docker/awesome-compose</a:t>
@@ -14211,13 +14218,22 @@
           <a:p>
             <a:pPr lvl="1"/>
             <a:r>
-              <a:rPr lang="en-IN" dirty="0" err="1"/>
-              <a:t>VotingApp</a:t>
+              <a:rPr lang="en-IN" dirty="0"/>
+              <a:t>Voting App Example - </a:t>
             </a:r>
             <a:r>
-              <a:rPr lang="en-IN" dirty="0"/>
-              <a:t> Example - https://github.com/dockersamples/example-voting-app</a:t>
+              <a:rPr lang="en-IN" dirty="0">
+                <a:hlinkClick r:id="rId3"/>
+              </a:rPr>
+              <a:t>https://github.com/dockersamples/example-voting-app</a:t>
             </a:r>
+            <a:endParaRPr lang="en-IN" dirty="0"/>
+          </a:p>
+          <a:p>
+            <a:pPr marL="457200" lvl="1" indent="0">
+              <a:buNone/>
+            </a:pPr>
+            <a:endParaRPr lang="en-IN" dirty="0"/>
           </a:p>
           <a:p>
             <a:pPr marL="914400" lvl="2" indent="0">

</xml_diff>

<commit_message>
Day 12 notes updated
</commit_message>
<xml_diff>
--- a/Day12/DockerAndKubernetes_Training-Day12.pptx
+++ b/Day12/DockerAndKubernetes_Training-Day12.pptx
@@ -199,7 +199,7 @@
           <a:p>
             <a:fld id="{B09F413D-6E72-4B8A-80ED-A580F7C91B71}" type="datetimeFigureOut">
               <a:rPr lang="en-IN" smtClean="0"/>
-              <a:t>20-04-2023</a:t>
+              <a:t>21-04-2023</a:t>
             </a:fld>
             <a:endParaRPr lang="en-IN"/>
           </a:p>
@@ -802,7 +802,7 @@
           <a:p>
             <a:fld id="{12E8600E-B0EE-4521-BF40-4B72FBA06775}" type="datetimeFigureOut">
               <a:rPr lang="en-IN" smtClean="0"/>
-              <a:t>20-04-2023</a:t>
+              <a:t>21-04-2023</a:t>
             </a:fld>
             <a:endParaRPr lang="en-IN"/>
           </a:p>
@@ -1891,7 +1891,7 @@
             <a:fld id="{49F3E739-D457-46E5-B626-C9B182A007EE}" type="datetimeFigureOut">
               <a:rPr lang="en-US" smtClean="0"/>
               <a:pPr/>
-              <a:t>4/20/2023</a:t>
+              <a:t>4/21/2023</a:t>
             </a:fld>
             <a:endParaRPr lang="en-US"/>
           </a:p>
@@ -2873,7 +2873,7 @@
             <a:fld id="{49F3E739-D457-46E5-B626-C9B182A007EE}" type="datetimeFigureOut">
               <a:rPr lang="en-US" smtClean="0"/>
               <a:pPr/>
-              <a:t>4/20/2023</a:t>
+              <a:t>4/21/2023</a:t>
             </a:fld>
             <a:endParaRPr lang="en-US"/>
           </a:p>
@@ -4009,7 +4009,7 @@
             <a:fld id="{49F3E739-D457-46E5-B626-C9B182A007EE}" type="datetimeFigureOut">
               <a:rPr lang="en-US" smtClean="0"/>
               <a:pPr/>
-              <a:t>4/20/2023</a:t>
+              <a:t>4/21/2023</a:t>
             </a:fld>
             <a:endParaRPr lang="en-US"/>
           </a:p>
@@ -5044,7 +5044,7 @@
             <a:fld id="{49F3E739-D457-46E5-B626-C9B182A007EE}" type="datetimeFigureOut">
               <a:rPr lang="en-US" smtClean="0"/>
               <a:pPr/>
-              <a:t>4/20/2023</a:t>
+              <a:t>4/21/2023</a:t>
             </a:fld>
             <a:endParaRPr lang="en-US"/>
           </a:p>
@@ -5706,7 +5706,7 @@
             <a:fld id="{49F3E739-D457-46E5-B626-C9B182A007EE}" type="datetimeFigureOut">
               <a:rPr lang="en-US" smtClean="0"/>
               <a:pPr/>
-              <a:t>4/20/2023</a:t>
+              <a:t>4/21/2023</a:t>
             </a:fld>
             <a:endParaRPr lang="en-US"/>
           </a:p>
@@ -6569,7 +6569,7 @@
             <a:fld id="{49F3E739-D457-46E5-B626-C9B182A007EE}" type="datetimeFigureOut">
               <a:rPr lang="en-US" smtClean="0"/>
               <a:pPr/>
-              <a:t>4/20/2023</a:t>
+              <a:t>4/21/2023</a:t>
             </a:fld>
             <a:endParaRPr lang="en-US"/>
           </a:p>
@@ -6760,7 +6760,7 @@
           <a:p>
             <a:fld id="{12E8600E-B0EE-4521-BF40-4B72FBA06775}" type="datetimeFigureOut">
               <a:rPr lang="en-IN" smtClean="0"/>
-              <a:t>20-04-2023</a:t>
+              <a:t>21-04-2023</a:t>
             </a:fld>
             <a:endParaRPr lang="en-IN"/>
           </a:p>
@@ -7732,7 +7732,7 @@
           <a:p>
             <a:fld id="{12E8600E-B0EE-4521-BF40-4B72FBA06775}" type="datetimeFigureOut">
               <a:rPr lang="en-IN" smtClean="0"/>
-              <a:t>20-04-2023</a:t>
+              <a:t>21-04-2023</a:t>
             </a:fld>
             <a:endParaRPr lang="en-IN"/>
           </a:p>
@@ -7943,7 +7943,7 @@
           <a:p>
             <a:fld id="{12E8600E-B0EE-4521-BF40-4B72FBA06775}" type="datetimeFigureOut">
               <a:rPr lang="en-IN" smtClean="0"/>
-              <a:t>20-04-2023</a:t>
+              <a:t>21-04-2023</a:t>
             </a:fld>
             <a:endParaRPr lang="en-IN"/>
           </a:p>
@@ -8977,7 +8977,7 @@
           <a:p>
             <a:fld id="{12E8600E-B0EE-4521-BF40-4B72FBA06775}" type="datetimeFigureOut">
               <a:rPr lang="en-IN" smtClean="0"/>
-              <a:t>20-04-2023</a:t>
+              <a:t>21-04-2023</a:t>
             </a:fld>
             <a:endParaRPr lang="en-IN"/>
           </a:p>
@@ -9249,7 +9249,7 @@
           <a:p>
             <a:fld id="{12E8600E-B0EE-4521-BF40-4B72FBA06775}" type="datetimeFigureOut">
               <a:rPr lang="en-IN" smtClean="0"/>
-              <a:t>20-04-2023</a:t>
+              <a:t>21-04-2023</a:t>
             </a:fld>
             <a:endParaRPr lang="en-IN"/>
           </a:p>
@@ -9660,7 +9660,7 @@
             <a:fld id="{49F3E739-D457-46E5-B626-C9B182A007EE}" type="datetimeFigureOut">
               <a:rPr lang="en-US" smtClean="0"/>
               <a:pPr/>
-              <a:t>4/20/2023</a:t>
+              <a:t>4/21/2023</a:t>
             </a:fld>
             <a:endParaRPr lang="en-US"/>
           </a:p>
@@ -9788,7 +9788,7 @@
           <a:p>
             <a:fld id="{12E8600E-B0EE-4521-BF40-4B72FBA06775}" type="datetimeFigureOut">
               <a:rPr lang="en-IN" smtClean="0"/>
-              <a:t>20-04-2023</a:t>
+              <a:t>21-04-2023</a:t>
             </a:fld>
             <a:endParaRPr lang="en-IN"/>
           </a:p>
@@ -9883,7 +9883,7 @@
           <a:p>
             <a:fld id="{12E8600E-B0EE-4521-BF40-4B72FBA06775}" type="datetimeFigureOut">
               <a:rPr lang="en-IN" smtClean="0"/>
-              <a:t>20-04-2023</a:t>
+              <a:t>21-04-2023</a:t>
             </a:fld>
             <a:endParaRPr lang="en-IN"/>
           </a:p>
@@ -10964,7 +10964,7 @@
           <a:p>
             <a:fld id="{12E8600E-B0EE-4521-BF40-4B72FBA06775}" type="datetimeFigureOut">
               <a:rPr lang="en-IN" smtClean="0"/>
-              <a:t>20-04-2023</a:t>
+              <a:t>21-04-2023</a:t>
             </a:fld>
             <a:endParaRPr lang="en-IN"/>
           </a:p>
@@ -12073,7 +12073,7 @@
             <a:fld id="{49F3E739-D457-46E5-B626-C9B182A007EE}" type="datetimeFigureOut">
               <a:rPr lang="en-US" smtClean="0"/>
               <a:pPr/>
-              <a:t>4/20/2023</a:t>
+              <a:t>4/21/2023</a:t>
             </a:fld>
             <a:endParaRPr lang="en-US"/>
           </a:p>
@@ -13072,7 +13072,7 @@
             <a:fld id="{49F3E739-D457-46E5-B626-C9B182A007EE}" type="datetimeFigureOut">
               <a:rPr lang="en-US" smtClean="0"/>
               <a:pPr/>
-              <a:t>4/20/2023</a:t>
+              <a:t>4/21/2023</a:t>
             </a:fld>
             <a:endParaRPr lang="en-US"/>
           </a:p>
@@ -14037,6 +14037,17 @@
           <a:p>
             <a:r>
               <a:rPr lang="en-US" dirty="0"/>
+              <a:t>Voting-app example </a:t>
+            </a:r>
+            <a:r>
+              <a:rPr lang="en-US"/>
+              <a:t>architecture – in detail</a:t>
+            </a:r>
+            <a:endParaRPr lang="en-US" dirty="0"/>
+          </a:p>
+          <a:p>
+            <a:r>
+              <a:rPr lang="en-US" dirty="0"/>
               <a:t>Docker Compose – Demo</a:t>
             </a:r>
           </a:p>
@@ -14044,7 +14055,7 @@
             <a:pPr lvl="1"/>
             <a:r>
               <a:rPr lang="en-US" dirty="0"/>
-              <a:t>Small multi container setup</a:t>
+              <a:t>Small multi container brief</a:t>
             </a:r>
           </a:p>
           <a:p>
@@ -14052,6 +14063,20 @@
             <a:r>
               <a:rPr lang="en-US" dirty="0"/>
               <a:t>Example-Voting-App Setup</a:t>
+            </a:r>
+          </a:p>
+          <a:p>
+            <a:pPr lvl="2"/>
+            <a:r>
+              <a:rPr lang="en-US" dirty="0"/>
+              <a:t>Setup in individual container manner</a:t>
+            </a:r>
+          </a:p>
+          <a:p>
+            <a:pPr lvl="2"/>
+            <a:r>
+              <a:rPr lang="en-US" dirty="0"/>
+              <a:t>Establish links between container</a:t>
             </a:r>
           </a:p>
           <a:p>

</xml_diff>